<commit_message>
modif instructions test DPD
+ a few other modifs on the other tests
</commit_message>
<xml_diff>
--- a/src/Emotion_Regulation_JS/instructions/instructionsDiapo.pptx
+++ b/src/Emotion_Regulation_JS/instructions/instructionsDiapo.pptx
@@ -3002,21 +3002,8 @@
                   <a:srgbClr val="0070C0"/>
                 </a:solidFill>
               </a:rPr>
-              <a:t>TEST </a:t>
-            </a:r>
-            <a:r>
-              <a:rPr lang="fr-FR" sz="2400" b="1" dirty="0" smtClean="0">
-                <a:solidFill>
-                  <a:srgbClr val="0070C0"/>
-                </a:solidFill>
-              </a:rPr>
-              <a:t>D’ATTENTION:</a:t>
-            </a:r>
-            <a:endParaRPr lang="fr-FR" sz="2400" b="1" dirty="0" smtClean="0">
-              <a:solidFill>
-                <a:srgbClr val="0070C0"/>
-              </a:solidFill>
-            </a:endParaRPr>
+              <a:t>TEST D’ATTENTION:</a:t>
+            </a:r>
           </a:p>
           <a:p>
             <a:pPr algn="ctr"/>
@@ -3046,14 +3033,14 @@
       </p:sp>
       <p:sp>
         <p:nvSpPr>
-          <p:cNvPr id="3" name="Rectangle 2"/>
+          <p:cNvPr id="4" name="Rectangle 3"/>
           <p:cNvSpPr/>
           <p:nvPr/>
         </p:nvSpPr>
         <p:spPr>
           <a:xfrm>
-            <a:off x="1041966" y="4317964"/>
-            <a:ext cx="10108088" cy="1754326"/>
+            <a:off x="642017" y="4317964"/>
+            <a:ext cx="10907987" cy="1754326"/>
           </a:xfrm>
           <a:prstGeom prst="rect">
             <a:avLst/>
@@ -3152,7 +3139,25 @@
             </a:r>
             <a:r>
               <a:rPr lang="en-GB" sz="2400" dirty="0"/>
-              <a:t> pour continuer et lire la </a:t>
+              <a:t> </a:t>
+            </a:r>
+            <a:r>
+              <a:rPr lang="en-GB" sz="2400" dirty="0" smtClean="0"/>
+              <a:t>[</a:t>
+            </a:r>
+            <a:r>
+              <a:rPr lang="en-GB" sz="2400" dirty="0" smtClean="0">
+                <a:sym typeface="Wingdings" panose="05000000000000000000" pitchFamily="2" charset="2"/>
+              </a:rPr>
+              <a:t>] </a:t>
+            </a:r>
+            <a:r>
+              <a:rPr lang="en-GB" sz="2400" dirty="0" smtClean="0"/>
+              <a:t>pour </a:t>
+            </a:r>
+            <a:r>
+              <a:rPr lang="en-GB" sz="2400" dirty="0"/>
+              <a:t>continuer et lire la </a:t>
             </a:r>
             <a:r>
               <a:rPr lang="en-GB" sz="2400" dirty="0" smtClean="0"/>
@@ -3200,7 +3205,21 @@
             </a:r>
             <a:r>
               <a:rPr lang="en-GB" sz="2400" dirty="0"/>
-              <a:t> pour </a:t>
+              <a:t> </a:t>
+            </a:r>
+            <a:r>
+              <a:rPr lang="en-GB" sz="2400" dirty="0" smtClean="0"/>
+              <a:t>[</a:t>
+            </a:r>
+            <a:r>
+              <a:rPr lang="en-GB" sz="2400" dirty="0" smtClean="0">
+                <a:sym typeface="Wingdings" panose="05000000000000000000" pitchFamily="2" charset="2"/>
+              </a:rPr>
+              <a:t>] </a:t>
+            </a:r>
+            <a:r>
+              <a:rPr lang="en-GB" sz="2400" dirty="0" smtClean="0"/>
+              <a:t>pour </a:t>
             </a:r>
             <a:r>
               <a:rPr lang="en-GB" sz="2400" dirty="0" err="1"/>
@@ -4688,11 +4707,7 @@
             <a:pPr algn="ctr"/>
             <a:r>
               <a:rPr lang="fr-FR" sz="2400" dirty="0" smtClean="0"/>
-              <a:t>Il s’agit d’un test mesurant votre capacité à </a:t>
-            </a:r>
-            <a:r>
-              <a:rPr lang="fr-FR" sz="2400" dirty="0" smtClean="0"/>
-              <a:t>contrôler la manière dont les émotions capturent l’attention.</a:t>
+              <a:t>Il s’agit d’un test mesurant votre capacité à contrôler la manière dont les émotions capturent l’attention.</a:t>
             </a:r>
             <a:endParaRPr lang="en-GB" sz="2400" dirty="0"/>
           </a:p>
@@ -4785,7 +4800,6 @@
               <a:rPr lang="fr-FR" sz="2400" dirty="0"/>
               <a:t>au hasard, et vous recevrez la somme d'argent qui leur correspond (2 euros ou 5 centimes si vous avez répondu correctement, rien sinon).</a:t>
             </a:r>
-            <a:endParaRPr lang="fr-FR" sz="2400" dirty="0"/>
           </a:p>
         </p:txBody>
       </p:sp>
@@ -6158,11 +6172,7 @@
             </a:r>
             <a:r>
               <a:rPr lang="en-GB" sz="2400" dirty="0" smtClean="0"/>
-              <a:t> </a:t>
-            </a:r>
-            <a:r>
-              <a:rPr lang="en-GB" sz="2400" dirty="0" smtClean="0"/>
-              <a:t>300 </a:t>
+              <a:t> 300 </a:t>
             </a:r>
             <a:r>
               <a:rPr lang="en-GB" sz="2400" dirty="0" err="1" smtClean="0"/>
@@ -6170,13 +6180,8 @@
             </a:r>
             <a:r>
               <a:rPr lang="en-GB" sz="2400" dirty="0" smtClean="0"/>
-              <a:t> de </a:t>
-            </a:r>
-            <a:r>
-              <a:rPr lang="en-GB" sz="2400" dirty="0" smtClean="0"/>
-              <a:t>detection de visage.</a:t>
-            </a:r>
-            <a:endParaRPr lang="en-GB" sz="2400" dirty="0" smtClean="0"/>
+              <a:t> de detection de visage.</a:t>
+            </a:r>
           </a:p>
           <a:p>
             <a:pPr algn="ctr"/>

</xml_diff>